<commit_message>
Se hace la carpeta de entrega del proyecto.
</commit_message>
<xml_diff>
--- a/Presentación Proyecto.pptx
+++ b/Presentación Proyecto.pptx
@@ -226,7 +226,7 @@
           <a:p>
             <a:fld id="{2D9E7E3D-D617-4F21-B84F-B5CDAEE4FC9A}" type="datetimeFigureOut">
               <a:rPr lang="es-CO" smtClean="0"/>
-              <a:t>24/11/2024</a:t>
+              <a:t>28/11/2024</a:t>
             </a:fld>
             <a:endParaRPr lang="es-CO"/>
           </a:p>
@@ -643,7 +643,7 @@
           <a:p>
             <a:fld id="{2401A97E-3465-4899-805E-544C47698E2F}" type="datetimeFigureOut">
               <a:rPr lang="es-CO" smtClean="0"/>
-              <a:t>24/11/2024</a:t>
+              <a:t>28/11/2024</a:t>
             </a:fld>
             <a:endParaRPr lang="es-CO" dirty="0"/>
           </a:p>
@@ -843,7 +843,7 @@
           <a:p>
             <a:fld id="{1D8BD707-D9CF-40AE-B4C6-C98DA3205C09}" type="datetimeFigureOut">
               <a:rPr lang="en-US" smtClean="0"/>
-              <a:t>11/24/2024</a:t>
+              <a:t>11/28/2024</a:t>
             </a:fld>
             <a:endParaRPr lang="en-US"/>
           </a:p>
@@ -1053,7 +1053,7 @@
           <a:p>
             <a:fld id="{1D8BD707-D9CF-40AE-B4C6-C98DA3205C09}" type="datetimeFigureOut">
               <a:rPr lang="en-US" smtClean="0"/>
-              <a:t>11/24/2024</a:t>
+              <a:t>11/28/2024</a:t>
             </a:fld>
             <a:endParaRPr lang="en-US"/>
           </a:p>
@@ -1279,7 +1279,7 @@
           <a:p>
             <a:fld id="{1D8BD707-D9CF-40AE-B4C6-C98DA3205C09}" type="datetimeFigureOut">
               <a:rPr lang="en-US"/>
-              <a:t>11/24/2024</a:t>
+              <a:t>11/28/2024</a:t>
             </a:fld>
             <a:endParaRPr lang="en-US"/>
           </a:p>
@@ -1457,7 +1457,7 @@
           <a:p>
             <a:fld id="{1D8BD707-D9CF-40AE-B4C6-C98DA3205C09}" type="datetimeFigureOut">
               <a:rPr lang="en-US" smtClean="0"/>
-              <a:t>11/24/2024</a:t>
+              <a:t>11/28/2024</a:t>
             </a:fld>
             <a:endParaRPr lang="en-US"/>
           </a:p>
@@ -1733,7 +1733,7 @@
           <a:p>
             <a:fld id="{1D8BD707-D9CF-40AE-B4C6-C98DA3205C09}" type="datetimeFigureOut">
               <a:rPr lang="en-US" smtClean="0"/>
-              <a:t>11/24/2024</a:t>
+              <a:t>11/28/2024</a:t>
             </a:fld>
             <a:endParaRPr lang="en-US"/>
           </a:p>
@@ -2001,7 +2001,7 @@
           <a:p>
             <a:fld id="{1D8BD707-D9CF-40AE-B4C6-C98DA3205C09}" type="datetimeFigureOut">
               <a:rPr lang="en-US" smtClean="0"/>
-              <a:t>11/24/2024</a:t>
+              <a:t>11/28/2024</a:t>
             </a:fld>
             <a:endParaRPr lang="en-US"/>
           </a:p>
@@ -2416,7 +2416,7 @@
           <a:p>
             <a:fld id="{1D8BD707-D9CF-40AE-B4C6-C98DA3205C09}" type="datetimeFigureOut">
               <a:rPr lang="en-US" smtClean="0"/>
-              <a:t>11/24/2024</a:t>
+              <a:t>11/28/2024</a:t>
             </a:fld>
             <a:endParaRPr lang="en-US"/>
           </a:p>
@@ -2558,7 +2558,7 @@
           <a:p>
             <a:fld id="{1D8BD707-D9CF-40AE-B4C6-C98DA3205C09}" type="datetimeFigureOut">
               <a:rPr lang="en-US" smtClean="0"/>
-              <a:t>11/24/2024</a:t>
+              <a:t>11/28/2024</a:t>
             </a:fld>
             <a:endParaRPr lang="en-US"/>
           </a:p>
@@ -2671,7 +2671,7 @@
           <a:p>
             <a:fld id="{1D8BD707-D9CF-40AE-B4C6-C98DA3205C09}" type="datetimeFigureOut">
               <a:rPr lang="en-US" smtClean="0"/>
-              <a:t>11/24/2024</a:t>
+              <a:t>11/28/2024</a:t>
             </a:fld>
             <a:endParaRPr lang="en-US"/>
           </a:p>
@@ -2984,7 +2984,7 @@
           <a:p>
             <a:fld id="{1D8BD707-D9CF-40AE-B4C6-C98DA3205C09}" type="datetimeFigureOut">
               <a:rPr lang="en-US" smtClean="0"/>
-              <a:t>11/24/2024</a:t>
+              <a:t>11/28/2024</a:t>
             </a:fld>
             <a:endParaRPr lang="en-US"/>
           </a:p>
@@ -3273,7 +3273,7 @@
           <a:p>
             <a:fld id="{1D8BD707-D9CF-40AE-B4C6-C98DA3205C09}" type="datetimeFigureOut">
               <a:rPr lang="en-US" smtClean="0"/>
-              <a:t>11/24/2024</a:t>
+              <a:t>11/28/2024</a:t>
             </a:fld>
             <a:endParaRPr lang="en-US"/>
           </a:p>
@@ -3516,7 +3516,7 @@
           <a:p>
             <a:fld id="{1D8BD707-D9CF-40AE-B4C6-C98DA3205C09}" type="datetimeFigureOut">
               <a:rPr lang="en-US" smtClean="0"/>
-              <a:t>11/24/2024</a:t>
+              <a:t>11/28/2024</a:t>
             </a:fld>
             <a:endParaRPr lang="en-US"/>
           </a:p>
@@ -5330,7 +5330,7 @@
               <a:buAutoNum type="arabicPeriod"/>
             </a:pPr>
             <a:r>
-              <a:rPr lang="es-CO" dirty="0" smtClean="0"/>
+              <a:rPr lang="es-CO" b="1" dirty="0" smtClean="0"/>
               <a:t>Di</a:t>
             </a:r>
             <a:r>
@@ -5735,7 +5735,7 @@
         <p:spPr>
           <a:xfrm>
             <a:off x="420211" y="1354550"/>
-            <a:ext cx="8303578" cy="3416320"/>
+            <a:ext cx="8303578" cy="3693319"/>
           </a:xfrm>
           <a:prstGeom prst="rect">
             <a:avLst/>
@@ -5785,7 +5785,7 @@
             </a:r>
             <a:r>
               <a:rPr lang="es-CO" dirty="0" smtClean="0"/>
-              <a:t>.</a:t>
+              <a:t>se hace evidente en las dispensadoras de todas EPS.</a:t>
             </a:r>
           </a:p>
         </p:txBody>
@@ -6175,8 +6175,8 @@
         </p:nvSpPr>
         <p:spPr>
           <a:xfrm>
-            <a:off x="611822" y="1444688"/>
-            <a:ext cx="7922578" cy="2585323"/>
+            <a:off x="611822" y="1114495"/>
+            <a:ext cx="8074978" cy="3970318"/>
           </a:xfrm>
           <a:prstGeom prst="rect">
             <a:avLst/>
@@ -6192,47 +6192,67 @@
             <a:pPr algn="just"/>
             <a:r>
               <a:rPr lang="es-CO" dirty="0"/>
-              <a:t>El proyecto tendrá un alcance nacional, enfocándose inicialmente en los principales centros de salud urbanos y </a:t>
+              <a:t>El proyecto comenzará con un alcance a nivel distrital, enfocándose en la implementación y promoción de la plataforma en </a:t>
             </a:r>
             <a:r>
               <a:rPr lang="es-CO" dirty="0" smtClean="0"/>
-              <a:t>rurales, </a:t>
+              <a:t>las </a:t>
             </a:r>
             <a:r>
               <a:rPr lang="es-CO" dirty="0"/>
-              <a:t>que son frecuentemente </a:t>
+              <a:t>principales </a:t>
             </a:r>
             <a:r>
               <a:rPr lang="es-CO" dirty="0" smtClean="0"/>
-              <a:t>utilizados. </a:t>
+              <a:t>EPS y sus dispensadores de medicamentos, </a:t>
             </a:r>
             <a:r>
               <a:rPr lang="es-CO" dirty="0"/>
-              <a:t>Se creará una plataforma web accesible y fácil de usar, que se integrará con las bases de datos de </a:t>
+              <a:t>los cuales son frecuentemente utilizados por los pacientes. Una vez establecido en esta área, se expandirá gradualmente para </a:t>
             </a:r>
             <a:r>
               <a:rPr lang="es-CO" dirty="0" smtClean="0"/>
-              <a:t>las EPS y sus dispensadoras de medicamentos para </a:t>
+              <a:t>incluir a </a:t>
             </a:r>
             <a:r>
               <a:rPr lang="es-CO" dirty="0"/>
-              <a:t>proporcionar información precisa y en tiempo real sobre la disponibilidad de medicamentos.</a:t>
+              <a:t>todas las EPS y sus dispensadoras de medicamentos a nivel nacional. La plataforma será web, </a:t>
+            </a:r>
+            <a:r>
+              <a:rPr lang="es-CO" dirty="0" smtClean="0"/>
+              <a:t>accesible y </a:t>
+            </a:r>
+            <a:r>
+              <a:rPr lang="es-CO" dirty="0"/>
+              <a:t>fácil de </a:t>
+            </a:r>
+            <a:r>
+              <a:rPr lang="es-CO" dirty="0" smtClean="0"/>
+              <a:t>usar. </a:t>
+            </a:r>
+            <a:r>
+              <a:rPr lang="es-CO" dirty="0"/>
+              <a:t>S</a:t>
+            </a:r>
+            <a:r>
+              <a:rPr lang="es-CO" dirty="0" smtClean="0"/>
+              <a:t>e </a:t>
+            </a:r>
+            <a:r>
+              <a:rPr lang="es-CO" dirty="0"/>
+              <a:t>integrará con las bases de datos de las EPS y las dispensadoras para proporcionar información precisa y actualizada sobre la disponibilidad de medicamentos en tiempo real</a:t>
+            </a:r>
+            <a:r>
+              <a:rPr lang="es-CO" dirty="0" smtClean="0"/>
+              <a:t>.</a:t>
             </a:r>
           </a:p>
           <a:p>
             <a:pPr algn="just"/>
             <a:r>
               <a:rPr lang="es-CO" dirty="0"/>
-              <a:t>A largo plazo, se buscará la expansión del portal a todas las entidades de salud, tanto públicas como privadas, de todo el </a:t>
-            </a:r>
-            <a:r>
-              <a:rPr lang="es-CO" dirty="0" smtClean="0"/>
-              <a:t>país y se generara un modulo de logística para facilitar la entrega de medicamentos lo cual será una fuente de empleo.</a:t>
-            </a:r>
-            <a:endParaRPr lang="es-CO" dirty="0"/>
-          </a:p>
-          <a:p>
-            <a:endParaRPr lang="es-CO" dirty="0"/>
+              <a:t>Además, se implementará un módulo de logística diseñado para agilizar el seguimiento y la entrega de medicamentos, lo que incrementará la eficiencia del proceso. Este módulo no solo optimizará el servicio, sino que también generará nuevas oportunidades de empleo. En versiones futuras, se desarrollará una aplicación móvil que permitirá acceder a las consultas desde cualquier dispositivo, facilitando aún más la interacción con el sistema.</a:t>
+            </a:r>
           </a:p>
         </p:txBody>
       </p:sp>

</xml_diff>